<commit_message>
REPORTGEN-550 copy from ReportGenerator centos_support
</commit_message>
<xml_diff>
--- a/CastReporting.Reporting.Core/PortfolioTemplatesFiles/1- Portfolio-Powerpoint-components-library.pptx
+++ b/CastReporting.Reporting.Core/PortfolioTemplatesFiles/1- Portfolio-Powerpoint-components-library.pptx
@@ -2180,7 +2180,7 @@
           <a:p>
             <a:fld id="{268042A1-6D91-4513-A62D-1E3FD70C84BE}" type="datetimeFigureOut">
               <a:rPr lang="fr-FR" smtClean="0"/>
-              <a:t>09/04/2019</a:t>
+              <a:t>21/01/2019</a:t>
             </a:fld>
             <a:endParaRPr lang="fr-FR"/>
           </a:p>
@@ -2778,7 +2778,7 @@
             <a:fld id="{D8E3BBD6-5DF7-411E-B793-6A3558CCCDCA}" type="datetimeFigureOut">
               <a:rPr lang="fr-FR" smtClean="0"/>
               <a:pPr/>
-              <a:t>09/04/2019</a:t>
+              <a:t>21/01/2019</a:t>
             </a:fld>
             <a:endParaRPr lang="fr-FR" dirty="0"/>
           </a:p>
@@ -2941,7 +2941,7 @@
             <a:fld id="{D8E3BBD6-5DF7-411E-B793-6A3558CCCDCA}" type="datetimeFigureOut">
               <a:rPr lang="fr-FR" smtClean="0"/>
               <a:pPr/>
-              <a:t>09/04/2019</a:t>
+              <a:t>21/01/2019</a:t>
             </a:fld>
             <a:endParaRPr lang="fr-FR" dirty="0"/>
           </a:p>
@@ -4446,7 +4446,7 @@
             <a:fld id="{D8E3BBD6-5DF7-411E-B793-6A3558CCCDCA}" type="datetimeFigureOut">
               <a:rPr lang="fr-FR" smtClean="0"/>
               <a:pPr/>
-              <a:t>09/04/2019</a:t>
+              <a:t>21/01/2019</a:t>
             </a:fld>
             <a:endParaRPr lang="fr-FR" dirty="0"/>
           </a:p>
@@ -6806,7 +6806,7 @@
             <a:fld id="{D8E3BBD6-5DF7-411E-B793-6A3558CCCDCA}" type="datetimeFigureOut">
               <a:rPr lang="fr-FR" smtClean="0"/>
               <a:pPr/>
-              <a:t>09/04/2019</a:t>
+              <a:t>21/01/2019</a:t>
             </a:fld>
             <a:endParaRPr lang="fr-FR" dirty="0"/>
           </a:p>
@@ -9432,7 +9432,7 @@
             <a:fld id="{D8E3BBD6-5DF7-411E-B793-6A3558CCCDCA}" type="datetimeFigureOut">
               <a:rPr lang="fr-FR" smtClean="0"/>
               <a:pPr/>
-              <a:t>09/04/2019</a:t>
+              <a:t>21/01/2019</a:t>
             </a:fld>
             <a:endParaRPr lang="fr-FR" dirty="0"/>
           </a:p>
@@ -12341,7 +12341,7 @@
             <a:fld id="{D8E3BBD6-5DF7-411E-B793-6A3558CCCDCA}" type="datetimeFigureOut">
               <a:rPr lang="fr-FR" smtClean="0"/>
               <a:pPr/>
-              <a:t>09/04/2019</a:t>
+              <a:t>21/01/2019</a:t>
             </a:fld>
             <a:endParaRPr lang="fr-FR" dirty="0"/>
           </a:p>
@@ -14125,7 +14125,7 @@
             <a:fld id="{D8E3BBD6-5DF7-411E-B793-6A3558CCCDCA}" type="datetimeFigureOut">
               <a:rPr lang="fr-FR" smtClean="0"/>
               <a:pPr/>
-              <a:t>09/04/2019</a:t>
+              <a:t>21/01/2019</a:t>
             </a:fld>
             <a:endParaRPr lang="fr-FR" dirty="0"/>
           </a:p>
@@ -14205,7 +14205,7 @@
             <a:fld id="{D8E3BBD6-5DF7-411E-B793-6A3558CCCDCA}" type="datetimeFigureOut">
               <a:rPr lang="fr-FR" smtClean="0"/>
               <a:pPr/>
-              <a:t>09/04/2019</a:t>
+              <a:t>21/01/2019</a:t>
             </a:fld>
             <a:endParaRPr lang="fr-FR" dirty="0"/>
           </a:p>
@@ -14465,7 +14465,7 @@
             <a:fld id="{D8E3BBD6-5DF7-411E-B793-6A3558CCCDCA}" type="datetimeFigureOut">
               <a:rPr lang="fr-FR" smtClean="0"/>
               <a:pPr/>
-              <a:t>09/04/2019</a:t>
+              <a:t>21/01/2019</a:t>
             </a:fld>
             <a:endParaRPr lang="fr-FR" dirty="0"/>
           </a:p>
@@ -14707,7 +14707,7 @@
             <a:fld id="{D8E3BBD6-5DF7-411E-B793-6A3558CCCDCA}" type="datetimeFigureOut">
               <a:rPr lang="fr-FR" smtClean="0"/>
               <a:pPr/>
-              <a:t>09/04/2019</a:t>
+              <a:t>21/01/2019</a:t>
             </a:fld>
             <a:endParaRPr lang="fr-FR" dirty="0"/>
           </a:p>
@@ -14909,7 +14909,7 @@
             <a:fld id="{D8E3BBD6-5DF7-411E-B793-6A3558CCCDCA}" type="datetimeFigureOut">
               <a:rPr lang="fr-FR" smtClean="0"/>
               <a:pPr/>
-              <a:t>09/04/2019</a:t>
+              <a:t>21/01/2019</a:t>
             </a:fld>
             <a:endParaRPr lang="fr-FR" dirty="0"/>
           </a:p>

</xml_diff>